<commit_message>
Finalisation du ppt pour la capsule
</commit_message>
<xml_diff>
--- a/Doc/capsule_equipe4_donnees_spatiales.pptx
+++ b/Doc/capsule_equipe4_donnees_spatiales.pptx
@@ -5,7 +5,7 @@
     <p:sldMasterId id="2147483699" r:id="rId1"/>
   </p:sldMasterIdLst>
   <p:notesMasterIdLst>
-    <p:notesMasterId r:id="rId24"/>
+    <p:notesMasterId r:id="rId23"/>
   </p:notesMasterIdLst>
   <p:sldIdLst>
     <p:sldId id="256" r:id="rId2"/>
@@ -21,15 +21,14 @@
     <p:sldId id="265" r:id="rId12"/>
     <p:sldId id="275" r:id="rId13"/>
     <p:sldId id="272" r:id="rId14"/>
-    <p:sldId id="267" r:id="rId15"/>
-    <p:sldId id="274" r:id="rId16"/>
-    <p:sldId id="277" r:id="rId17"/>
-    <p:sldId id="278" r:id="rId18"/>
-    <p:sldId id="280" r:id="rId19"/>
-    <p:sldId id="273" r:id="rId20"/>
-    <p:sldId id="271" r:id="rId21"/>
-    <p:sldId id="268" r:id="rId22"/>
-    <p:sldId id="276" r:id="rId23"/>
+    <p:sldId id="274" r:id="rId15"/>
+    <p:sldId id="277" r:id="rId16"/>
+    <p:sldId id="278" r:id="rId17"/>
+    <p:sldId id="280" r:id="rId18"/>
+    <p:sldId id="273" r:id="rId19"/>
+    <p:sldId id="271" r:id="rId20"/>
+    <p:sldId id="268" r:id="rId21"/>
+    <p:sldId id="276" r:id="rId22"/>
   </p:sldIdLst>
   <p:sldSz cx="12192000" cy="6858000"/>
   <p:notesSz cx="6858000" cy="9144000"/>
@@ -3195,7 +3194,7 @@
           <a:p>
             <a:fld id="{CB6B4AAB-487F-4415-BA5B-DD6E77021E44}" type="datetimeFigureOut">
               <a:rPr lang="fr-CA" smtClean="0"/>
-              <a:t>2023-04-03</a:t>
+              <a:t>2023-04-24</a:t>
             </a:fld>
             <a:endParaRPr lang="fr-CA"/>
           </a:p>
@@ -3507,45 +3506,96 @@
           <a:bodyPr/>
           <a:lstStyle/>
           <a:p>
-            <a:r>
-              <a:rPr lang="fr-CA" dirty="0"/>
-              <a:t>MRF: </a:t>
-            </a:r>
-          </a:p>
-          <a:p>
-            <a:pPr marL="228600" indent="-228600">
-              <a:buFont typeface="+mj-lt"/>
-              <a:buAutoNum type="arabicPeriod"/>
-            </a:pPr>
-            <a:r>
-              <a:rPr lang="fr-CA" dirty="0"/>
-              <a:t>On effectue des prédictions sur chacun des pixels</a:t>
-            </a:r>
-          </a:p>
-          <a:p>
-            <a:pPr marL="228600" indent="-228600">
-              <a:buFont typeface="+mj-lt"/>
-              <a:buAutoNum type="arabicPeriod"/>
-            </a:pPr>
-            <a:r>
-              <a:rPr lang="fr-CA" dirty="0"/>
-              <a:t>On régularise les prédictions en appliquant un « champs aléatoire de Markov ». I.e. on lisse les prédictions en fonction de la structure de dépendance spatiale.</a:t>
-            </a:r>
-          </a:p>
-          <a:p>
-            <a:pPr marL="0" indent="0">
-              <a:buFont typeface="+mj-lt"/>
-              <a:buNone/>
-            </a:pPr>
             <a:endParaRPr lang="fr-CA" dirty="0"/>
           </a:p>
+        </p:txBody>
+      </p:sp>
+      <p:sp>
+        <p:nvSpPr>
+          <p:cNvPr id="4" name="Espace réservé du numéro de diapositive 3"/>
+          <p:cNvSpPr>
+            <a:spLocks noGrp="1"/>
+          </p:cNvSpPr>
+          <p:nvPr>
+            <p:ph type="sldNum" sz="quarter" idx="5"/>
+          </p:nvPr>
+        </p:nvSpPr>
+        <p:spPr/>
+        <p:txBody>
+          <a:bodyPr/>
+          <a:lstStyle/>
+          <a:p>
+            <a:fld id="{CBD013D1-221E-4D8B-87AC-B25C3A5CCE38}" type="slidenum">
+              <a:rPr lang="fr-CA" smtClean="0"/>
+              <a:t>1</a:t>
+            </a:fld>
+            <a:endParaRPr lang="fr-CA"/>
+          </a:p>
+        </p:txBody>
+      </p:sp>
+    </p:spTree>
+    <p:extLst>
+      <p:ext uri="{BB962C8B-B14F-4D97-AF65-F5344CB8AC3E}">
+        <p14:creationId xmlns:p14="http://schemas.microsoft.com/office/powerpoint/2010/main" val="4100801716"/>
+      </p:ext>
+    </p:extLst>
+  </p:cSld>
+  <p:clrMapOvr>
+    <a:masterClrMapping/>
+  </p:clrMapOvr>
+</p:notes>
+</file>
+
+<file path=ppt/notesSlides/notesSlide2.xml><?xml version="1.0" encoding="utf-8"?>
+<p:notes xmlns:a="http://schemas.openxmlformats.org/drawingml/2006/main" xmlns:r="http://schemas.openxmlformats.org/officeDocument/2006/relationships" xmlns:p="http://schemas.openxmlformats.org/presentationml/2006/main">
+  <p:cSld>
+    <p:spTree>
+      <p:nvGrpSpPr>
+        <p:cNvPr id="1" name=""/>
+        <p:cNvGrpSpPr/>
+        <p:nvPr/>
+      </p:nvGrpSpPr>
+      <p:grpSpPr>
+        <a:xfrm>
+          <a:off x="0" y="0"/>
+          <a:ext cx="0" cy="0"/>
+          <a:chOff x="0" y="0"/>
+          <a:chExt cx="0" cy="0"/>
+        </a:xfrm>
+      </p:grpSpPr>
+      <p:sp>
+        <p:nvSpPr>
+          <p:cNvPr id="2" name="Espace réservé de l'image des diapositives 1"/>
+          <p:cNvSpPr>
+            <a:spLocks noGrp="1" noRot="1" noChangeAspect="1"/>
+          </p:cNvSpPr>
+          <p:nvPr>
+            <p:ph type="sldImg"/>
+          </p:nvPr>
+        </p:nvSpPr>
+        <p:spPr/>
+      </p:sp>
+      <p:sp>
+        <p:nvSpPr>
+          <p:cNvPr id="3" name="Espace réservé des notes 2"/>
+          <p:cNvSpPr>
+            <a:spLocks noGrp="1"/>
+          </p:cNvSpPr>
+          <p:nvPr>
+            <p:ph type="body" idx="1"/>
+          </p:nvPr>
+        </p:nvSpPr>
+        <p:spPr/>
+        <p:txBody>
+          <a:bodyPr/>
+          <a:lstStyle/>
           <a:p>
             <a:pPr marL="0" indent="0">
               <a:buFont typeface="+mj-lt"/>
               <a:buNone/>
             </a:pPr>
             <a:r>
-              <a:rPr lang="fr-CA" dirty="0"/>
+              <a:rPr lang="fr-CA" b="1" dirty="0"/>
               <a:t>Modèle SAR</a:t>
             </a:r>
           </a:p>
@@ -3568,6 +3618,105 @@
               <a:rPr lang="fr-CA" dirty="0"/>
               <a:t>La matrice W est la matrice de contiguïté entre les observations Y</a:t>
             </a:r>
+          </a:p>
+          <a:p>
+            <a:endParaRPr lang="fr-CA" dirty="0"/>
+          </a:p>
+          <a:p>
+            <a:endParaRPr lang="fr-CA" dirty="0"/>
+          </a:p>
+          <a:p>
+            <a:r>
+              <a:rPr lang="fr-CA" b="1" dirty="0"/>
+              <a:t>MRF: </a:t>
+            </a:r>
+          </a:p>
+          <a:p>
+            <a:pPr marL="228600" indent="-228600">
+              <a:buFont typeface="Arial" panose="020B0604020202020204" pitchFamily="34" charset="0"/>
+              <a:buChar char="•"/>
+            </a:pPr>
+            <a:r>
+              <a:rPr lang="fr-CA" dirty="0"/>
+              <a:t>On effectue des prédictions sur chacun des pixels, puis on effectue une régularisation MRF</a:t>
+            </a:r>
+          </a:p>
+          <a:p>
+            <a:pPr marL="228600" indent="-228600">
+              <a:buFont typeface="Arial" panose="020B0604020202020204" pitchFamily="34" charset="0"/>
+              <a:buChar char="•"/>
+            </a:pPr>
+            <a:r>
+              <a:rPr lang="fr-CA" dirty="0"/>
+              <a:t>Cette méthode s’appuie sur la théorie bayésienne</a:t>
+            </a:r>
+          </a:p>
+          <a:p>
+            <a:pPr marL="685800" lvl="1" indent="-228600">
+              <a:buFont typeface="Arial" panose="020B0604020202020204" pitchFamily="34" charset="0"/>
+              <a:buChar char="•"/>
+            </a:pPr>
+            <a:r>
+              <a:rPr lang="fr-CA" dirty="0"/>
+              <a:t>On définit une distribution à priori pour les classes à prédire</a:t>
+            </a:r>
+          </a:p>
+          <a:p>
+            <a:pPr marL="685800" lvl="1" indent="-228600">
+              <a:buFont typeface="Arial" panose="020B0604020202020204" pitchFamily="34" charset="0"/>
+              <a:buChar char="•"/>
+            </a:pPr>
+            <a:r>
+              <a:rPr lang="fr-CA" dirty="0"/>
+              <a:t>On calcule la vraisemblance des observations en tenant compte de deux aspects:</a:t>
+            </a:r>
+          </a:p>
+          <a:p>
+            <a:pPr marL="1143000" lvl="2" indent="-228600">
+              <a:buFont typeface="Arial" panose="020B0604020202020204" pitchFamily="34" charset="0"/>
+              <a:buChar char="•"/>
+            </a:pPr>
+            <a:r>
+              <a:rPr lang="fr-CA" dirty="0"/>
+              <a:t>Spectral : les variables explicatives</a:t>
+            </a:r>
+          </a:p>
+          <a:p>
+            <a:pPr marL="1143000" lvl="2" indent="-228600">
+              <a:buFont typeface="Arial" panose="020B0604020202020204" pitchFamily="34" charset="0"/>
+              <a:buChar char="•"/>
+            </a:pPr>
+            <a:r>
+              <a:rPr lang="fr-CA" dirty="0"/>
+              <a:t>Spatial : dans l’espace</a:t>
+            </a:r>
+          </a:p>
+          <a:p>
+            <a:pPr marL="228600" lvl="0" indent="-228600">
+              <a:buFont typeface="Arial" panose="020B0604020202020204" pitchFamily="34" charset="0"/>
+              <a:buChar char="•"/>
+            </a:pPr>
+            <a:r>
+              <a:rPr lang="fr-CA" dirty="0"/>
+              <a:t>L’idée est de maximiser la probabilité a posteriori des classes prédites, tout en minimisant les dissimilarités entre les voisins</a:t>
+            </a:r>
+          </a:p>
+          <a:p>
+            <a:pPr marL="228600" lvl="0" indent="-228600">
+              <a:buFont typeface="Arial" panose="020B0604020202020204" pitchFamily="34" charset="0"/>
+              <a:buChar char="•"/>
+            </a:pPr>
+            <a:r>
+              <a:rPr lang="fr-CA" dirty="0"/>
+              <a:t>De façon itérative, on va ajuster les prédictions jusqu’à convergence des résultats.</a:t>
+            </a:r>
+          </a:p>
+          <a:p>
+            <a:pPr marL="0" indent="0">
+              <a:buFont typeface="+mj-lt"/>
+              <a:buNone/>
+            </a:pPr>
+            <a:endParaRPr lang="fr-CA" dirty="0"/>
           </a:p>
         </p:txBody>
       </p:sp>
@@ -3607,7 +3756,7 @@
 </p:notes>
 </file>
 
-<file path=ppt/notesSlides/notesSlide2.xml><?xml version="1.0" encoding="utf-8"?>
+<file path=ppt/notesSlides/notesSlide3.xml><?xml version="1.0" encoding="utf-8"?>
 <p:notes xmlns:a="http://schemas.openxmlformats.org/drawingml/2006/main" xmlns:r="http://schemas.openxmlformats.org/officeDocument/2006/relationships" xmlns:p="http://schemas.openxmlformats.org/presentationml/2006/main">
   <p:cSld>
     <p:spTree>
@@ -3682,7 +3831,7 @@
           <a:p>
             <a:fld id="{CBD013D1-221E-4D8B-87AC-B25C3A5CCE38}" type="slidenum">
               <a:rPr lang="fr-CA" smtClean="0"/>
-              <a:t>15</a:t>
+              <a:t>14</a:t>
             </a:fld>
             <a:endParaRPr lang="fr-CA"/>
           </a:p>
@@ -3701,7 +3850,7 @@
 </p:notes>
 </file>
 
-<file path=ppt/notesSlides/notesSlide3.xml><?xml version="1.0" encoding="utf-8"?>
+<file path=ppt/notesSlides/notesSlide4.xml><?xml version="1.0" encoding="utf-8"?>
 <p:notes xmlns:a="http://schemas.openxmlformats.org/drawingml/2006/main" xmlns:r="http://schemas.openxmlformats.org/officeDocument/2006/relationships" xmlns:p="http://schemas.openxmlformats.org/presentationml/2006/main">
   <p:cSld>
     <p:spTree>
@@ -3766,7 +3915,7 @@
           <a:p>
             <a:fld id="{CBD013D1-221E-4D8B-87AC-B25C3A5CCE38}" type="slidenum">
               <a:rPr lang="fr-CA" smtClean="0"/>
-              <a:t>16</a:t>
+              <a:t>15</a:t>
             </a:fld>
             <a:endParaRPr lang="fr-CA"/>
           </a:p>
@@ -3785,7 +3934,7 @@
 </p:notes>
 </file>
 
-<file path=ppt/notesSlides/notesSlide4.xml><?xml version="1.0" encoding="utf-8"?>
+<file path=ppt/notesSlides/notesSlide5.xml><?xml version="1.0" encoding="utf-8"?>
 <p:notes xmlns:a="http://schemas.openxmlformats.org/drawingml/2006/main" xmlns:r="http://schemas.openxmlformats.org/officeDocument/2006/relationships" xmlns:p="http://schemas.openxmlformats.org/presentationml/2006/main">
   <p:cSld>
     <p:spTree>
@@ -3891,7 +4040,7 @@
           <a:p>
             <a:fld id="{CBD013D1-221E-4D8B-87AC-B25C3A5CCE38}" type="slidenum">
               <a:rPr lang="fr-CA" smtClean="0"/>
-              <a:t>18</a:t>
+              <a:t>17</a:t>
             </a:fld>
             <a:endParaRPr lang="fr-CA"/>
           </a:p>
@@ -10857,14 +11006,14 @@
           <p:nvPr/>
         </p:nvPicPr>
         <p:blipFill rotWithShape="1">
-          <a:blip r:embed="rId2">
+          <a:blip r:embed="rId3">
             <a:alphaModFix amt="70000"/>
             <a:extLst>
               <a:ext uri="{28A0092B-C50C-407E-A947-70E740481C1C}">
                 <a14:useLocalDpi xmlns:a14="http://schemas.microsoft.com/office/drawing/2010/main" val="0"/>
               </a:ext>
               <a:ext uri="{837473B0-CC2E-450A-ABE3-18F120FF3D39}">
-                <a1611:picAttrSrcUrl xmlns:a1611="http://schemas.microsoft.com/office/drawing/2016/11/main" r:id="rId3"/>
+                <a1611:picAttrSrcUrl xmlns:a1611="http://schemas.microsoft.com/office/drawing/2016/11/main" r:id="rId4"/>
               </a:ext>
             </a:extLst>
           </a:blip>
@@ -15860,7 +16009,12 @@
             <p:ph type="title"/>
           </p:nvPr>
         </p:nvSpPr>
-        <p:spPr/>
+        <p:spPr>
+          <a:xfrm>
+            <a:off x="838200" y="365125"/>
+            <a:ext cx="8839200" cy="1325563"/>
+          </a:xfrm>
+        </p:spPr>
         <p:txBody>
           <a:bodyPr>
             <a:normAutofit fontScale="90000"/>
@@ -16049,20 +16203,6 @@
                   </a:spcAft>
                 </a:pPr>
                 <a:r>
-                  <a:rPr lang="fr-CA" dirty="0"/>
-                  <a:t>Arbres de classification spatiaux</a:t>
-                </a:r>
-              </a:p>
-              <a:p>
-                <a:pPr>
-                  <a:spcBef>
-                    <a:spcPts val="600"/>
-                  </a:spcBef>
-                  <a:spcAft>
-                    <a:spcPts val="600"/>
-                  </a:spcAft>
-                </a:pPr>
-                <a:r>
                   <a:rPr lang="fr-CA" dirty="0">
                     <a:solidFill>
                       <a:schemeClr val="accent6">
@@ -16085,6 +16225,26 @@
                 <a:r>
                   <a:rPr lang="fr-CA" dirty="0"/>
                   <a:t>CNN</a:t>
+                </a:r>
+              </a:p>
+              <a:p>
+                <a:pPr>
+                  <a:spcBef>
+                    <a:spcPts val="600"/>
+                  </a:spcBef>
+                  <a:spcAft>
+                    <a:spcPts val="600"/>
+                  </a:spcAft>
+                </a:pPr>
+                <a:r>
+                  <a:rPr lang="fr-CA" dirty="0">
+                    <a:solidFill>
+                      <a:schemeClr val="bg1">
+                        <a:lumMod val="65000"/>
+                      </a:schemeClr>
+                    </a:solidFill>
+                  </a:rPr>
+                  <a:t>Arbres de décision spatiaux</a:t>
                 </a:r>
               </a:p>
             </p:txBody>
@@ -16113,7 +16273,7 @@
                 <a:ext cx="10515600" cy="4486275"/>
               </a:xfrm>
               <a:blipFill>
-                <a:blip r:embed="rId3"/>
+                <a:blip r:embed="rId5"/>
                 <a:stretch>
                   <a:fillRect l="-1217"/>
                 </a:stretch>
@@ -16266,9 +16426,16 @@
             <p:ph type="title"/>
           </p:nvPr>
         </p:nvSpPr>
-        <p:spPr/>
+        <p:spPr>
+          <a:xfrm>
+            <a:off x="838200" y="365125"/>
+            <a:ext cx="8305800" cy="1325563"/>
+          </a:xfrm>
+        </p:spPr>
         <p:txBody>
-          <a:bodyPr/>
+          <a:bodyPr>
+            <a:normAutofit fontScale="90000"/>
+          </a:bodyPr>
           <a:lstStyle/>
           <a:p>
             <a:r>
@@ -16395,7 +16562,7 @@
         </p:blipFill>
         <p:spPr>
           <a:xfrm>
-            <a:off x="3362325" y="1884995"/>
+            <a:off x="376237" y="1690688"/>
             <a:ext cx="5010150" cy="3657600"/>
           </a:xfrm>
           <a:prstGeom prst="rect">
@@ -16451,70 +16618,12 @@
           </a:p>
         </p:txBody>
       </p:sp>
-    </p:spTree>
-    <p:extLst>
-      <p:ext uri="{BB962C8B-B14F-4D97-AF65-F5344CB8AC3E}">
-        <p14:creationId xmlns:p14="http://schemas.microsoft.com/office/powerpoint/2010/main" val="2503653745"/>
-      </p:ext>
-    </p:extLst>
-  </p:cSld>
-  <p:clrMapOvr>
-    <a:masterClrMapping/>
-  </p:clrMapOvr>
-</p:sld>
-</file>
-
-<file path=ppt/slides/slide14.xml><?xml version="1.0" encoding="utf-8"?>
-<p:sld xmlns:a="http://schemas.openxmlformats.org/drawingml/2006/main" xmlns:r="http://schemas.openxmlformats.org/officeDocument/2006/relationships" xmlns:p="http://schemas.openxmlformats.org/presentationml/2006/main" show="0">
-  <p:cSld>
-    <p:spTree>
-      <p:nvGrpSpPr>
-        <p:cNvPr id="1" name=""/>
-        <p:cNvGrpSpPr/>
-        <p:nvPr/>
-      </p:nvGrpSpPr>
-      <p:grpSpPr>
-        <a:xfrm>
-          <a:off x="0" y="0"/>
-          <a:ext cx="0" cy="0"/>
-          <a:chOff x="0" y="0"/>
-          <a:chExt cx="0" cy="0"/>
-        </a:xfrm>
-      </p:grpSpPr>
-      <p:sp>
-        <p:nvSpPr>
-          <p:cNvPr id="2" name="Titre 1">
+      <p:grpSp>
+        <p:nvGrpSpPr>
+          <p:cNvPr id="8" name="Groupe 7">
             <a:extLst>
               <a:ext uri="{FF2B5EF4-FFF2-40B4-BE49-F238E27FC236}">
-                <a16:creationId xmlns:a16="http://schemas.microsoft.com/office/drawing/2014/main" id="{0C25C522-2B19-BCB0-B29F-54FBB67B4B38}"/>
-              </a:ext>
-            </a:extLst>
-          </p:cNvPr>
-          <p:cNvSpPr>
-            <a:spLocks noGrp="1"/>
-          </p:cNvSpPr>
-          <p:nvPr>
-            <p:ph type="title"/>
-          </p:nvPr>
-        </p:nvSpPr>
-        <p:spPr/>
-        <p:txBody>
-          <a:bodyPr/>
-          <a:lstStyle/>
-          <a:p>
-            <a:r>
-              <a:rPr lang="fr-CA" dirty="0"/>
-              <a:t>Réseaux de neurones convolutifs</a:t>
-            </a:r>
-          </a:p>
-        </p:txBody>
-      </p:sp>
-      <p:grpSp>
-        <p:nvGrpSpPr>
-          <p:cNvPr id="6" name="Groupe 5">
-            <a:extLst>
-              <a:ext uri="{FF2B5EF4-FFF2-40B4-BE49-F238E27FC236}">
-                <a16:creationId xmlns:a16="http://schemas.microsoft.com/office/drawing/2014/main" id="{B11C51B6-69F7-8B60-61F2-77090C0BE237}"/>
+                <a16:creationId xmlns:a16="http://schemas.microsoft.com/office/drawing/2014/main" id="{625185B4-4797-1A0D-D868-EABD8FDCFC36}"/>
               </a:ext>
             </a:extLst>
           </p:cNvPr>
@@ -16523,18 +16632,18 @@
         </p:nvGrpSpPr>
         <p:grpSpPr>
           <a:xfrm>
-            <a:off x="956277" y="2688440"/>
-            <a:ext cx="9487388" cy="3113880"/>
+            <a:off x="5513990" y="2355206"/>
+            <a:ext cx="6301773" cy="2450148"/>
             <a:chOff x="984558" y="3150354"/>
             <a:chExt cx="9487388" cy="3113880"/>
           </a:xfrm>
         </p:grpSpPr>
         <p:pic>
           <p:nvPicPr>
-            <p:cNvPr id="4" name="Image 3" descr="Une image contenant diagramme&#10;&#10;Description générée automatiquement">
+            <p:cNvPr id="9" name="Image 8" descr="Une image contenant diagramme&#10;&#10;Description générée automatiquement">
               <a:extLst>
                 <a:ext uri="{FF2B5EF4-FFF2-40B4-BE49-F238E27FC236}">
-                  <a16:creationId xmlns:a16="http://schemas.microsoft.com/office/drawing/2014/main" id="{6B28AB5A-CEA6-5E8E-0C63-DC616CDDA331}"/>
+                  <a16:creationId xmlns:a16="http://schemas.microsoft.com/office/drawing/2014/main" id="{C4AFE637-81D0-22D1-3680-CCDBB7EC4594}"/>
                 </a:ext>
               </a:extLst>
             </p:cNvPr>
@@ -16544,13 +16653,13 @@
             <p:nvPr/>
           </p:nvPicPr>
           <p:blipFill>
-            <a:blip r:embed="rId2">
+            <a:blip r:embed="rId5">
               <a:extLst>
                 <a:ext uri="{28A0092B-C50C-407E-A947-70E740481C1C}">
                   <a14:useLocalDpi xmlns:a14="http://schemas.microsoft.com/office/drawing/2010/main" val="0"/>
                 </a:ext>
                 <a:ext uri="{837473B0-CC2E-450A-ABE3-18F120FF3D39}">
-                  <a1611:picAttrSrcUrl xmlns:a1611="http://schemas.microsoft.com/office/drawing/2016/11/main" r:id="rId3"/>
+                  <a1611:picAttrSrcUrl xmlns:a1611="http://schemas.microsoft.com/office/drawing/2016/11/main" r:id="rId6"/>
                 </a:ext>
               </a:extLst>
             </a:blip>
@@ -16570,10 +16679,10 @@
         </p:pic>
         <p:sp>
           <p:nvSpPr>
-            <p:cNvPr id="5" name="ZoneTexte 4">
+            <p:cNvPr id="10" name="ZoneTexte 9">
               <a:extLst>
                 <a:ext uri="{FF2B5EF4-FFF2-40B4-BE49-F238E27FC236}">
-                  <a16:creationId xmlns:a16="http://schemas.microsoft.com/office/drawing/2014/main" id="{0A4A2E79-5222-201B-0164-B252BC5296E8}"/>
+                  <a16:creationId xmlns:a16="http://schemas.microsoft.com/office/drawing/2014/main" id="{EAFD547F-2389-F6A6-218F-11A5AC46CD3C}"/>
                 </a:ext>
               </a:extLst>
             </p:cNvPr>
@@ -16598,7 +16707,7 @@
             <a:p>
               <a:r>
                 <a:rPr lang="fr-CA" sz="900">
-                  <a:hlinkClick r:id="rId3" tooltip="https://stackoverflow.com/questions/42733971/convolutional-layer-to-fully-connected-layer-in-cnn"/>
+                  <a:hlinkClick r:id="rId6" tooltip="https://stackoverflow.com/questions/42733971/convolutional-layer-to-fully-connected-layer-in-cnn"/>
                 </a:rPr>
                 <a:t>Cette photo</a:t>
               </a:r>
@@ -16617,96 +16726,10 @@
           </p:txBody>
         </p:sp>
       </p:grpSp>
-      <p:sp>
-        <p:nvSpPr>
-          <p:cNvPr id="7" name="Espace réservé de la date 6">
-            <a:extLst>
-              <a:ext uri="{FF2B5EF4-FFF2-40B4-BE49-F238E27FC236}">
-                <a16:creationId xmlns:a16="http://schemas.microsoft.com/office/drawing/2014/main" id="{AA56C9DE-272B-375B-A468-0C9FB840A977}"/>
-              </a:ext>
-            </a:extLst>
-          </p:cNvPr>
-          <p:cNvSpPr>
-            <a:spLocks noGrp="1"/>
-          </p:cNvSpPr>
-          <p:nvPr>
-            <p:ph type="dt" sz="half" idx="10"/>
-          </p:nvPr>
-        </p:nvSpPr>
-        <p:spPr/>
-        <p:txBody>
-          <a:bodyPr/>
-          <a:lstStyle/>
-          <a:p>
-            <a:r>
-              <a:rPr lang="fr-FR"/>
-              <a:t>Session d'hiver 2023</a:t>
-            </a:r>
-            <a:endParaRPr lang="en-US"/>
-          </a:p>
-        </p:txBody>
-      </p:sp>
-      <p:sp>
-        <p:nvSpPr>
-          <p:cNvPr id="8" name="Espace réservé du pied de page 7">
-            <a:extLst>
-              <a:ext uri="{FF2B5EF4-FFF2-40B4-BE49-F238E27FC236}">
-                <a16:creationId xmlns:a16="http://schemas.microsoft.com/office/drawing/2014/main" id="{2620B347-AA7D-B8E1-A63D-78D6C36FB3C3}"/>
-              </a:ext>
-            </a:extLst>
-          </p:cNvPr>
-          <p:cNvSpPr>
-            <a:spLocks noGrp="1"/>
-          </p:cNvSpPr>
-          <p:nvPr>
-            <p:ph type="ftr" sz="quarter" idx="11"/>
-          </p:nvPr>
-        </p:nvSpPr>
-        <p:spPr/>
-        <p:txBody>
-          <a:bodyPr/>
-          <a:lstStyle/>
-          <a:p>
-            <a:r>
-              <a:rPr lang="en-US"/>
-              <a:t>Université Laval - Cours STT-7335</a:t>
-            </a:r>
-          </a:p>
-        </p:txBody>
-      </p:sp>
-      <p:sp>
-        <p:nvSpPr>
-          <p:cNvPr id="9" name="Espace réservé du numéro de diapositive 8">
-            <a:extLst>
-              <a:ext uri="{FF2B5EF4-FFF2-40B4-BE49-F238E27FC236}">
-                <a16:creationId xmlns:a16="http://schemas.microsoft.com/office/drawing/2014/main" id="{AC655DC8-E084-DD39-A4CD-EB2841C753B8}"/>
-              </a:ext>
-            </a:extLst>
-          </p:cNvPr>
-          <p:cNvSpPr>
-            <a:spLocks noGrp="1"/>
-          </p:cNvSpPr>
-          <p:nvPr>
-            <p:ph type="sldNum" sz="quarter" idx="12"/>
-          </p:nvPr>
-        </p:nvSpPr>
-        <p:spPr/>
-        <p:txBody>
-          <a:bodyPr/>
-          <a:lstStyle/>
-          <a:p>
-            <a:fld id="{73B850FF-6169-4056-8077-06FFA93A5366}" type="slidenum">
-              <a:rPr lang="en-US" smtClean="0"/>
-              <a:t>14</a:t>
-            </a:fld>
-            <a:endParaRPr lang="en-US"/>
-          </a:p>
-        </p:txBody>
-      </p:sp>
     </p:spTree>
     <p:extLst>
       <p:ext uri="{BB962C8B-B14F-4D97-AF65-F5344CB8AC3E}">
-        <p14:creationId xmlns:p14="http://schemas.microsoft.com/office/powerpoint/2010/main" val="1233074729"/>
+        <p14:creationId xmlns:p14="http://schemas.microsoft.com/office/powerpoint/2010/main" val="2503653745"/>
       </p:ext>
     </p:extLst>
   </p:cSld>
@@ -16716,7 +16739,7 @@
 </p:sld>
 </file>
 
-<file path=ppt/slides/slide15.xml><?xml version="1.0" encoding="utf-8"?>
+<file path=ppt/slides/slide14.xml><?xml version="1.0" encoding="utf-8"?>
 <p:sld xmlns:a="http://schemas.openxmlformats.org/drawingml/2006/main" xmlns:r="http://schemas.openxmlformats.org/officeDocument/2006/relationships" xmlns:p="http://schemas.openxmlformats.org/presentationml/2006/main">
   <p:cSld>
     <p:spTree>
@@ -16841,7 +16864,7 @@
           <a:p>
             <a:fld id="{73B850FF-6169-4056-8077-06FFA93A5366}" type="slidenum">
               <a:rPr lang="en-US" smtClean="0"/>
-              <a:t>15</a:t>
+              <a:t>14</a:t>
             </a:fld>
             <a:endParaRPr lang="en-US"/>
           </a:p>
@@ -17440,7 +17463,7 @@
 </p:sld>
 </file>
 
-<file path=ppt/slides/slide16.xml><?xml version="1.0" encoding="utf-8"?>
+<file path=ppt/slides/slide15.xml><?xml version="1.0" encoding="utf-8"?>
 <p:sld xmlns:a="http://schemas.openxmlformats.org/drawingml/2006/main" xmlns:r="http://schemas.openxmlformats.org/officeDocument/2006/relationships" xmlns:p="http://schemas.openxmlformats.org/presentationml/2006/main">
   <p:cSld>
     <p:spTree>
@@ -17567,7 +17590,7 @@
           <a:p>
             <a:fld id="{73B850FF-6169-4056-8077-06FFA93A5366}" type="slidenum">
               <a:rPr lang="en-US" smtClean="0"/>
-              <a:t>16</a:t>
+              <a:t>15</a:t>
             </a:fld>
             <a:endParaRPr lang="en-US"/>
           </a:p>
@@ -17724,7 +17747,7 @@
         </p:nvGrpSpPr>
         <p:grpSpPr>
           <a:xfrm>
-            <a:off x="2291862" y="4174067"/>
+            <a:off x="2373924" y="4186441"/>
             <a:ext cx="609600" cy="656492"/>
             <a:chOff x="2608385" y="4092006"/>
             <a:chExt cx="609600" cy="656492"/>
@@ -17797,131 +17820,8 @@
           </p:nvSpPr>
           <p:spPr>
             <a:xfrm>
-              <a:off x="2813539" y="4326467"/>
-              <a:ext cx="199292" cy="187570"/>
-            </a:xfrm>
-            <a:prstGeom prst="flowChartConnector">
-              <a:avLst/>
-            </a:prstGeom>
-            <a:solidFill>
-              <a:schemeClr val="tx1"/>
-            </a:solidFill>
-          </p:spPr>
-          <p:style>
-            <a:lnRef idx="2">
-              <a:schemeClr val="accent1">
-                <a:shade val="50000"/>
-              </a:schemeClr>
-            </a:lnRef>
-            <a:fillRef idx="1">
-              <a:schemeClr val="accent1"/>
-            </a:fillRef>
-            <a:effectRef idx="0">
-              <a:schemeClr val="accent1"/>
-            </a:effectRef>
-            <a:fontRef idx="minor">
-              <a:schemeClr val="lt1"/>
-            </a:fontRef>
-          </p:style>
-          <p:txBody>
-            <a:bodyPr rtlCol="0" anchor="ctr"/>
-            <a:lstStyle/>
-            <a:p>
-              <a:pPr algn="ctr"/>
-              <a:endParaRPr lang="fr-CA"/>
-            </a:p>
-          </p:txBody>
-        </p:sp>
-      </p:grpSp>
-      <p:grpSp>
-        <p:nvGrpSpPr>
-          <p:cNvPr id="12" name="Groupe 11">
-            <a:extLst>
-              <a:ext uri="{FF2B5EF4-FFF2-40B4-BE49-F238E27FC236}">
-                <a16:creationId xmlns:a16="http://schemas.microsoft.com/office/drawing/2014/main" id="{9C1A85C6-880F-F96C-1823-A6268B69F4D2}"/>
-              </a:ext>
-            </a:extLst>
-          </p:cNvPr>
-          <p:cNvGrpSpPr/>
-          <p:nvPr/>
-        </p:nvGrpSpPr>
-        <p:grpSpPr>
-          <a:xfrm>
-            <a:off x="3862755" y="4919765"/>
-            <a:ext cx="609600" cy="656492"/>
-            <a:chOff x="2608385" y="4092006"/>
-            <a:chExt cx="609600" cy="656492"/>
-          </a:xfrm>
-        </p:grpSpPr>
-        <p:sp>
-          <p:nvSpPr>
-            <p:cNvPr id="13" name="Organigramme : Connecteur 12">
-              <a:extLst>
-                <a:ext uri="{FF2B5EF4-FFF2-40B4-BE49-F238E27FC236}">
-                  <a16:creationId xmlns:a16="http://schemas.microsoft.com/office/drawing/2014/main" id="{DDC4BAF7-7E61-7365-57D2-381FC4ABD94E}"/>
-                </a:ext>
-              </a:extLst>
-            </p:cNvPr>
-            <p:cNvSpPr/>
-            <p:nvPr/>
-          </p:nvSpPr>
-          <p:spPr>
-            <a:xfrm>
-              <a:off x="2608385" y="4092006"/>
-              <a:ext cx="609600" cy="656492"/>
-            </a:xfrm>
-            <a:prstGeom prst="flowChartConnector">
-              <a:avLst/>
-            </a:prstGeom>
-            <a:solidFill>
-              <a:schemeClr val="tx2">
-                <a:lumMod val="25000"/>
-                <a:lumOff val="75000"/>
-                <a:alpha val="67059"/>
-              </a:schemeClr>
-            </a:solidFill>
-          </p:spPr>
-          <p:style>
-            <a:lnRef idx="2">
-              <a:schemeClr val="accent1">
-                <a:shade val="50000"/>
-              </a:schemeClr>
-            </a:lnRef>
-            <a:fillRef idx="1">
-              <a:schemeClr val="accent1"/>
-            </a:fillRef>
-            <a:effectRef idx="0">
-              <a:schemeClr val="accent1"/>
-            </a:effectRef>
-            <a:fontRef idx="minor">
-              <a:schemeClr val="lt1"/>
-            </a:fontRef>
-          </p:style>
-          <p:txBody>
-            <a:bodyPr rtlCol="0" anchor="ctr"/>
-            <a:lstStyle/>
-            <a:p>
-              <a:pPr algn="ctr"/>
-              <a:endParaRPr lang="fr-CA"/>
-            </a:p>
-          </p:txBody>
-        </p:sp>
-        <p:sp>
-          <p:nvSpPr>
-            <p:cNvPr id="14" name="Organigramme : Connecteur 13">
-              <a:extLst>
-                <a:ext uri="{FF2B5EF4-FFF2-40B4-BE49-F238E27FC236}">
-                  <a16:creationId xmlns:a16="http://schemas.microsoft.com/office/drawing/2014/main" id="{B3946251-26B8-DFE6-58A9-0251BFBB9111}"/>
-                </a:ext>
-              </a:extLst>
-            </p:cNvPr>
-            <p:cNvSpPr/>
-            <p:nvPr/>
-          </p:nvSpPr>
-          <p:spPr>
-            <a:xfrm>
-              <a:off x="2813539" y="4326467"/>
-              <a:ext cx="199292" cy="187570"/>
+              <a:off x="2883877" y="4384432"/>
+              <a:ext cx="70338" cy="93784"/>
             </a:xfrm>
             <a:prstGeom prst="flowChartConnector">
               <a:avLst/>
@@ -18029,10 +17929,10 @@
       </p:sp>
       <p:grpSp>
         <p:nvGrpSpPr>
-          <p:cNvPr id="17" name="Groupe 16">
+          <p:cNvPr id="15" name="Groupe 14">
             <a:extLst>
               <a:ext uri="{FF2B5EF4-FFF2-40B4-BE49-F238E27FC236}">
-                <a16:creationId xmlns:a16="http://schemas.microsoft.com/office/drawing/2014/main" id="{927A3C49-62B3-E84F-914C-03EBCDCA6D2E}"/>
+                <a16:creationId xmlns:a16="http://schemas.microsoft.com/office/drawing/2014/main" id="{0B7EE6E9-7380-57B3-D369-8AE8CD82E46A}"/>
               </a:ext>
             </a:extLst>
           </p:cNvPr>
@@ -18041,7 +17941,7 @@
         </p:nvGrpSpPr>
         <p:grpSpPr>
           <a:xfrm>
-            <a:off x="6095991" y="2594448"/>
+            <a:off x="4425463" y="4854657"/>
             <a:ext cx="609600" cy="656492"/>
             <a:chOff x="2608385" y="4092006"/>
             <a:chExt cx="609600" cy="656492"/>
@@ -18049,10 +17949,10 @@
         </p:grpSpPr>
         <p:sp>
           <p:nvSpPr>
-            <p:cNvPr id="18" name="Organigramme : Connecteur 17">
+            <p:cNvPr id="20" name="Organigramme : Connecteur 19">
               <a:extLst>
                 <a:ext uri="{FF2B5EF4-FFF2-40B4-BE49-F238E27FC236}">
-                  <a16:creationId xmlns:a16="http://schemas.microsoft.com/office/drawing/2014/main" id="{B86FBE85-22A1-A810-F7BF-BBFF97CA5F60}"/>
+                  <a16:creationId xmlns:a16="http://schemas.microsoft.com/office/drawing/2014/main" id="{4731474A-57B8-0392-333A-AC0FDF5FCE4F}"/>
                 </a:ext>
               </a:extLst>
             </p:cNvPr>
@@ -18102,10 +18002,10 @@
         </p:sp>
         <p:sp>
           <p:nvSpPr>
-            <p:cNvPr id="19" name="Organigramme : Connecteur 18">
+            <p:cNvPr id="21" name="Organigramme : Connecteur 20">
               <a:extLst>
                 <a:ext uri="{FF2B5EF4-FFF2-40B4-BE49-F238E27FC236}">
-                  <a16:creationId xmlns:a16="http://schemas.microsoft.com/office/drawing/2014/main" id="{184D2048-408F-B4F9-C693-13FA6EF62D04}"/>
+                  <a16:creationId xmlns:a16="http://schemas.microsoft.com/office/drawing/2014/main" id="{F497C2A8-C4AF-282F-3431-59E4FB93310A}"/>
                 </a:ext>
               </a:extLst>
             </p:cNvPr>
@@ -18114,8 +18014,131 @@
           </p:nvSpPr>
           <p:spPr>
             <a:xfrm>
-              <a:off x="2813539" y="4326467"/>
-              <a:ext cx="199292" cy="187570"/>
+              <a:off x="2883877" y="4384432"/>
+              <a:ext cx="70338" cy="93784"/>
+            </a:xfrm>
+            <a:prstGeom prst="flowChartConnector">
+              <a:avLst/>
+            </a:prstGeom>
+            <a:solidFill>
+              <a:schemeClr val="tx1"/>
+            </a:solidFill>
+          </p:spPr>
+          <p:style>
+            <a:lnRef idx="2">
+              <a:schemeClr val="accent1">
+                <a:shade val="50000"/>
+              </a:schemeClr>
+            </a:lnRef>
+            <a:fillRef idx="1">
+              <a:schemeClr val="accent1"/>
+            </a:fillRef>
+            <a:effectRef idx="0">
+              <a:schemeClr val="accent1"/>
+            </a:effectRef>
+            <a:fontRef idx="minor">
+              <a:schemeClr val="lt1"/>
+            </a:fontRef>
+          </p:style>
+          <p:txBody>
+            <a:bodyPr rtlCol="0" anchor="ctr"/>
+            <a:lstStyle/>
+            <a:p>
+              <a:pPr algn="ctr"/>
+              <a:endParaRPr lang="fr-CA"/>
+            </a:p>
+          </p:txBody>
+        </p:sp>
+      </p:grpSp>
+      <p:grpSp>
+        <p:nvGrpSpPr>
+          <p:cNvPr id="22" name="Groupe 21">
+            <a:extLst>
+              <a:ext uri="{FF2B5EF4-FFF2-40B4-BE49-F238E27FC236}">
+                <a16:creationId xmlns:a16="http://schemas.microsoft.com/office/drawing/2014/main" id="{EF3F8BD7-2798-D5B4-BA74-B447E4CE13AF}"/>
+              </a:ext>
+            </a:extLst>
+          </p:cNvPr>
+          <p:cNvGrpSpPr/>
+          <p:nvPr/>
+        </p:nvGrpSpPr>
+        <p:grpSpPr>
+          <a:xfrm>
+            <a:off x="6899032" y="4830559"/>
+            <a:ext cx="609600" cy="656492"/>
+            <a:chOff x="2608385" y="4092006"/>
+            <a:chExt cx="609600" cy="656492"/>
+          </a:xfrm>
+        </p:grpSpPr>
+        <p:sp>
+          <p:nvSpPr>
+            <p:cNvPr id="23" name="Organigramme : Connecteur 22">
+              <a:extLst>
+                <a:ext uri="{FF2B5EF4-FFF2-40B4-BE49-F238E27FC236}">
+                  <a16:creationId xmlns:a16="http://schemas.microsoft.com/office/drawing/2014/main" id="{CEA9A400-7D69-35C1-238C-4CA172E23A00}"/>
+                </a:ext>
+              </a:extLst>
+            </p:cNvPr>
+            <p:cNvSpPr/>
+            <p:nvPr/>
+          </p:nvSpPr>
+          <p:spPr>
+            <a:xfrm>
+              <a:off x="2608385" y="4092006"/>
+              <a:ext cx="609600" cy="656492"/>
+            </a:xfrm>
+            <a:prstGeom prst="flowChartConnector">
+              <a:avLst/>
+            </a:prstGeom>
+            <a:solidFill>
+              <a:schemeClr val="tx2">
+                <a:lumMod val="25000"/>
+                <a:lumOff val="75000"/>
+                <a:alpha val="67059"/>
+              </a:schemeClr>
+            </a:solidFill>
+          </p:spPr>
+          <p:style>
+            <a:lnRef idx="2">
+              <a:schemeClr val="accent1">
+                <a:shade val="50000"/>
+              </a:schemeClr>
+            </a:lnRef>
+            <a:fillRef idx="1">
+              <a:schemeClr val="accent1"/>
+            </a:fillRef>
+            <a:effectRef idx="0">
+              <a:schemeClr val="accent1"/>
+            </a:effectRef>
+            <a:fontRef idx="minor">
+              <a:schemeClr val="lt1"/>
+            </a:fontRef>
+          </p:style>
+          <p:txBody>
+            <a:bodyPr rtlCol="0" anchor="ctr"/>
+            <a:lstStyle/>
+            <a:p>
+              <a:pPr algn="ctr"/>
+              <a:endParaRPr lang="fr-CA"/>
+            </a:p>
+          </p:txBody>
+        </p:sp>
+        <p:sp>
+          <p:nvSpPr>
+            <p:cNvPr id="24" name="Organigramme : Connecteur 23">
+              <a:extLst>
+                <a:ext uri="{FF2B5EF4-FFF2-40B4-BE49-F238E27FC236}">
+                  <a16:creationId xmlns:a16="http://schemas.microsoft.com/office/drawing/2014/main" id="{C89E1188-D1EF-0ABF-2D9B-74DA5A562D2B}"/>
+                </a:ext>
+              </a:extLst>
+            </p:cNvPr>
+            <p:cNvSpPr/>
+            <p:nvPr/>
+          </p:nvSpPr>
+          <p:spPr>
+            <a:xfrm>
+              <a:off x="2883877" y="4384432"/>
+              <a:ext cx="70338" cy="93784"/>
             </a:xfrm>
             <a:prstGeom prst="flowChartConnector">
               <a:avLst/>
@@ -18163,7 +18186,7 @@
 </p:sld>
 </file>
 
-<file path=ppt/slides/slide17.xml><?xml version="1.0" encoding="utf-8"?>
+<file path=ppt/slides/slide16.xml><?xml version="1.0" encoding="utf-8"?>
 <p:sld xmlns:a="http://schemas.openxmlformats.org/drawingml/2006/main" xmlns:r="http://schemas.openxmlformats.org/officeDocument/2006/relationships" xmlns:p="http://schemas.openxmlformats.org/presentationml/2006/main">
   <p:cSld>
     <p:spTree>
@@ -18289,7 +18312,7 @@
           <a:p>
             <a:fld id="{73B850FF-6169-4056-8077-06FFA93A5366}" type="slidenum">
               <a:rPr lang="en-US" smtClean="0"/>
-              <a:t>17</a:t>
+              <a:t>16</a:t>
             </a:fld>
             <a:endParaRPr lang="en-US"/>
           </a:p>
@@ -19073,7 +19096,7 @@
 </p:sld>
 </file>
 
-<file path=ppt/slides/slide18.xml><?xml version="1.0" encoding="utf-8"?>
+<file path=ppt/slides/slide17.xml><?xml version="1.0" encoding="utf-8"?>
 <p:sld xmlns:a="http://schemas.openxmlformats.org/drawingml/2006/main" xmlns:r="http://schemas.openxmlformats.org/officeDocument/2006/relationships" xmlns:p="http://schemas.openxmlformats.org/presentationml/2006/main">
   <p:cSld>
     <p:spTree>
@@ -19264,7 +19287,7 @@
           <a:p>
             <a:fld id="{73B850FF-6169-4056-8077-06FFA93A5366}" type="slidenum">
               <a:rPr lang="en-US" smtClean="0"/>
-              <a:t>18</a:t>
+              <a:t>17</a:t>
             </a:fld>
             <a:endParaRPr lang="en-US"/>
           </a:p>
@@ -19283,7 +19306,7 @@
 </p:sld>
 </file>
 
-<file path=ppt/slides/slide19.xml><?xml version="1.0" encoding="utf-8"?>
+<file path=ppt/slides/slide18.xml><?xml version="1.0" encoding="utf-8"?>
 <p:sld xmlns:a="http://schemas.openxmlformats.org/drawingml/2006/main" xmlns:r="http://schemas.openxmlformats.org/officeDocument/2006/relationships" xmlns:p="http://schemas.openxmlformats.org/presentationml/2006/main">
   <p:cSld>
     <p:bg>
@@ -30276,7 +30299,7 @@
                   <a:spcPts val="600"/>
                 </a:spcAft>
               </a:pPr>
-              <a:t>19</a:t>
+              <a:t>18</a:t>
             </a:fld>
             <a:endParaRPr lang="en-US"/>
           </a:p>
@@ -30295,182 +30318,7 @@
 </p:sld>
 </file>
 
-<file path=ppt/slides/slide2.xml><?xml version="1.0" encoding="utf-8"?>
-<p:sld xmlns:a="http://schemas.openxmlformats.org/drawingml/2006/main" xmlns:r="http://schemas.openxmlformats.org/officeDocument/2006/relationships" xmlns:p="http://schemas.openxmlformats.org/presentationml/2006/main">
-  <p:cSld>
-    <p:spTree>
-      <p:nvGrpSpPr>
-        <p:cNvPr id="1" name=""/>
-        <p:cNvGrpSpPr/>
-        <p:nvPr/>
-      </p:nvGrpSpPr>
-      <p:grpSpPr>
-        <a:xfrm>
-          <a:off x="0" y="0"/>
-          <a:ext cx="0" cy="0"/>
-          <a:chOff x="0" y="0"/>
-          <a:chExt cx="0" cy="0"/>
-        </a:xfrm>
-      </p:grpSpPr>
-      <p:sp>
-        <p:nvSpPr>
-          <p:cNvPr id="2" name="Titre 1">
-            <a:extLst>
-              <a:ext uri="{FF2B5EF4-FFF2-40B4-BE49-F238E27FC236}">
-                <a16:creationId xmlns:a16="http://schemas.microsoft.com/office/drawing/2014/main" id="{D75EDBBE-26C2-9785-25F4-F356B1EF0F98}"/>
-              </a:ext>
-            </a:extLst>
-          </p:cNvPr>
-          <p:cNvSpPr>
-            <a:spLocks noGrp="1"/>
-          </p:cNvSpPr>
-          <p:nvPr>
-            <p:ph type="title"/>
-          </p:nvPr>
-        </p:nvSpPr>
-        <p:spPr/>
-        <p:txBody>
-          <a:bodyPr/>
-          <a:lstStyle/>
-          <a:p>
-            <a:r>
-              <a:rPr lang="fr-CA" dirty="0"/>
-              <a:t>Plan de la présentation</a:t>
-            </a:r>
-          </a:p>
-        </p:txBody>
-      </p:sp>
-      <p:graphicFrame>
-        <p:nvGraphicFramePr>
-          <p:cNvPr id="4" name="Espace réservé du contenu 3">
-            <a:extLst>
-              <a:ext uri="{FF2B5EF4-FFF2-40B4-BE49-F238E27FC236}">
-                <a16:creationId xmlns:a16="http://schemas.microsoft.com/office/drawing/2014/main" id="{A6E9978F-1E7D-E001-DE31-F0972536E7D6}"/>
-              </a:ext>
-            </a:extLst>
-          </p:cNvPr>
-          <p:cNvGraphicFramePr>
-            <a:graphicFrameLocks noGrp="1"/>
-          </p:cNvGraphicFramePr>
-          <p:nvPr>
-            <p:ph idx="1"/>
-            <p:extLst>
-              <p:ext uri="{D42A27DB-BD31-4B8C-83A1-F6EECF244321}">
-                <p14:modId xmlns:p14="http://schemas.microsoft.com/office/powerpoint/2010/main" val="3314096864"/>
-              </p:ext>
-            </p:extLst>
-          </p:nvPr>
-        </p:nvGraphicFramePr>
-        <p:xfrm>
-          <a:off x="1463538" y="2545617"/>
-          <a:ext cx="8613912" cy="2816958"/>
-        </p:xfrm>
-        <a:graphic>
-          <a:graphicData uri="http://schemas.openxmlformats.org/drawingml/2006/diagram">
-            <dgm:relIds xmlns:dgm="http://schemas.openxmlformats.org/drawingml/2006/diagram" xmlns:r="http://schemas.openxmlformats.org/officeDocument/2006/relationships" r:dm="rId2" r:lo="rId3" r:qs="rId4" r:cs="rId5"/>
-          </a:graphicData>
-        </a:graphic>
-      </p:graphicFrame>
-      <p:sp>
-        <p:nvSpPr>
-          <p:cNvPr id="11" name="Espace réservé de la date 10">
-            <a:extLst>
-              <a:ext uri="{FF2B5EF4-FFF2-40B4-BE49-F238E27FC236}">
-                <a16:creationId xmlns:a16="http://schemas.microsoft.com/office/drawing/2014/main" id="{29C730F0-BED0-5A9E-FFE2-67F8BBD95B66}"/>
-              </a:ext>
-            </a:extLst>
-          </p:cNvPr>
-          <p:cNvSpPr>
-            <a:spLocks noGrp="1"/>
-          </p:cNvSpPr>
-          <p:nvPr>
-            <p:ph type="dt" sz="half" idx="10"/>
-          </p:nvPr>
-        </p:nvSpPr>
-        <p:spPr/>
-        <p:txBody>
-          <a:bodyPr/>
-          <a:lstStyle/>
-          <a:p>
-            <a:r>
-              <a:rPr lang="fr-FR"/>
-              <a:t>Session d'hiver 2023</a:t>
-            </a:r>
-            <a:endParaRPr lang="en-US"/>
-          </a:p>
-        </p:txBody>
-      </p:sp>
-      <p:sp>
-        <p:nvSpPr>
-          <p:cNvPr id="12" name="Espace réservé du pied de page 11">
-            <a:extLst>
-              <a:ext uri="{FF2B5EF4-FFF2-40B4-BE49-F238E27FC236}">
-                <a16:creationId xmlns:a16="http://schemas.microsoft.com/office/drawing/2014/main" id="{473C4718-764E-EB86-5153-E888F969D93D}"/>
-              </a:ext>
-            </a:extLst>
-          </p:cNvPr>
-          <p:cNvSpPr>
-            <a:spLocks noGrp="1"/>
-          </p:cNvSpPr>
-          <p:nvPr>
-            <p:ph type="ftr" sz="quarter" idx="11"/>
-          </p:nvPr>
-        </p:nvSpPr>
-        <p:spPr/>
-        <p:txBody>
-          <a:bodyPr/>
-          <a:lstStyle/>
-          <a:p>
-            <a:r>
-              <a:rPr lang="en-US"/>
-              <a:t>Université Laval - Cours STT-7335</a:t>
-            </a:r>
-          </a:p>
-        </p:txBody>
-      </p:sp>
-      <p:sp>
-        <p:nvSpPr>
-          <p:cNvPr id="13" name="Espace réservé du numéro de diapositive 12">
-            <a:extLst>
-              <a:ext uri="{FF2B5EF4-FFF2-40B4-BE49-F238E27FC236}">
-                <a16:creationId xmlns:a16="http://schemas.microsoft.com/office/drawing/2014/main" id="{96D5BAF7-1139-757D-D3CD-4A07201D84C1}"/>
-              </a:ext>
-            </a:extLst>
-          </p:cNvPr>
-          <p:cNvSpPr>
-            <a:spLocks noGrp="1"/>
-          </p:cNvSpPr>
-          <p:nvPr>
-            <p:ph type="sldNum" sz="quarter" idx="12"/>
-          </p:nvPr>
-        </p:nvSpPr>
-        <p:spPr/>
-        <p:txBody>
-          <a:bodyPr/>
-          <a:lstStyle/>
-          <a:p>
-            <a:fld id="{73B850FF-6169-4056-8077-06FFA93A5366}" type="slidenum">
-              <a:rPr lang="en-US" smtClean="0"/>
-              <a:t>2</a:t>
-            </a:fld>
-            <a:endParaRPr lang="en-US"/>
-          </a:p>
-        </p:txBody>
-      </p:sp>
-    </p:spTree>
-    <p:extLst>
-      <p:ext uri="{BB962C8B-B14F-4D97-AF65-F5344CB8AC3E}">
-        <p14:creationId xmlns:p14="http://schemas.microsoft.com/office/powerpoint/2010/main" val="3599994164"/>
-      </p:ext>
-    </p:extLst>
-  </p:cSld>
-  <p:clrMapOvr>
-    <a:masterClrMapping/>
-  </p:clrMapOvr>
-</p:sld>
-</file>
-
-<file path=ppt/slides/slide20.xml><?xml version="1.0" encoding="utf-8"?>
+<file path=ppt/slides/slide19.xml><?xml version="1.0" encoding="utf-8"?>
 <p:sld xmlns:a="http://schemas.openxmlformats.org/drawingml/2006/main" xmlns:r="http://schemas.openxmlformats.org/officeDocument/2006/relationships" xmlns:p="http://schemas.openxmlformats.org/presentationml/2006/main">
   <p:cSld>
     <p:spTree>
@@ -30687,7 +30535,7 @@
           <a:p>
             <a:fld id="{73B850FF-6169-4056-8077-06FFA93A5366}" type="slidenum">
               <a:rPr lang="en-US" smtClean="0"/>
-              <a:t>20</a:t>
+              <a:t>19</a:t>
             </a:fld>
             <a:endParaRPr lang="en-US"/>
           </a:p>
@@ -30706,7 +30554,182 @@
 </p:sld>
 </file>
 
-<file path=ppt/slides/slide21.xml><?xml version="1.0" encoding="utf-8"?>
+<file path=ppt/slides/slide2.xml><?xml version="1.0" encoding="utf-8"?>
+<p:sld xmlns:a="http://schemas.openxmlformats.org/drawingml/2006/main" xmlns:r="http://schemas.openxmlformats.org/officeDocument/2006/relationships" xmlns:p="http://schemas.openxmlformats.org/presentationml/2006/main">
+  <p:cSld>
+    <p:spTree>
+      <p:nvGrpSpPr>
+        <p:cNvPr id="1" name=""/>
+        <p:cNvGrpSpPr/>
+        <p:nvPr/>
+      </p:nvGrpSpPr>
+      <p:grpSpPr>
+        <a:xfrm>
+          <a:off x="0" y="0"/>
+          <a:ext cx="0" cy="0"/>
+          <a:chOff x="0" y="0"/>
+          <a:chExt cx="0" cy="0"/>
+        </a:xfrm>
+      </p:grpSpPr>
+      <p:sp>
+        <p:nvSpPr>
+          <p:cNvPr id="2" name="Titre 1">
+            <a:extLst>
+              <a:ext uri="{FF2B5EF4-FFF2-40B4-BE49-F238E27FC236}">
+                <a16:creationId xmlns:a16="http://schemas.microsoft.com/office/drawing/2014/main" id="{D75EDBBE-26C2-9785-25F4-F356B1EF0F98}"/>
+              </a:ext>
+            </a:extLst>
+          </p:cNvPr>
+          <p:cNvSpPr>
+            <a:spLocks noGrp="1"/>
+          </p:cNvSpPr>
+          <p:nvPr>
+            <p:ph type="title"/>
+          </p:nvPr>
+        </p:nvSpPr>
+        <p:spPr/>
+        <p:txBody>
+          <a:bodyPr/>
+          <a:lstStyle/>
+          <a:p>
+            <a:r>
+              <a:rPr lang="fr-CA" dirty="0"/>
+              <a:t>Plan de la présentation</a:t>
+            </a:r>
+          </a:p>
+        </p:txBody>
+      </p:sp>
+      <p:graphicFrame>
+        <p:nvGraphicFramePr>
+          <p:cNvPr id="4" name="Espace réservé du contenu 3">
+            <a:extLst>
+              <a:ext uri="{FF2B5EF4-FFF2-40B4-BE49-F238E27FC236}">
+                <a16:creationId xmlns:a16="http://schemas.microsoft.com/office/drawing/2014/main" id="{A6E9978F-1E7D-E001-DE31-F0972536E7D6}"/>
+              </a:ext>
+            </a:extLst>
+          </p:cNvPr>
+          <p:cNvGraphicFramePr>
+            <a:graphicFrameLocks noGrp="1"/>
+          </p:cNvGraphicFramePr>
+          <p:nvPr>
+            <p:ph idx="1"/>
+            <p:extLst>
+              <p:ext uri="{D42A27DB-BD31-4B8C-83A1-F6EECF244321}">
+                <p14:modId xmlns:p14="http://schemas.microsoft.com/office/powerpoint/2010/main" val="3314096864"/>
+              </p:ext>
+            </p:extLst>
+          </p:nvPr>
+        </p:nvGraphicFramePr>
+        <p:xfrm>
+          <a:off x="1463538" y="2545617"/>
+          <a:ext cx="8613912" cy="2816958"/>
+        </p:xfrm>
+        <a:graphic>
+          <a:graphicData uri="http://schemas.openxmlformats.org/drawingml/2006/diagram">
+            <dgm:relIds xmlns:dgm="http://schemas.openxmlformats.org/drawingml/2006/diagram" xmlns:r="http://schemas.openxmlformats.org/officeDocument/2006/relationships" r:dm="rId2" r:lo="rId3" r:qs="rId4" r:cs="rId5"/>
+          </a:graphicData>
+        </a:graphic>
+      </p:graphicFrame>
+      <p:sp>
+        <p:nvSpPr>
+          <p:cNvPr id="11" name="Espace réservé de la date 10">
+            <a:extLst>
+              <a:ext uri="{FF2B5EF4-FFF2-40B4-BE49-F238E27FC236}">
+                <a16:creationId xmlns:a16="http://schemas.microsoft.com/office/drawing/2014/main" id="{29C730F0-BED0-5A9E-FFE2-67F8BBD95B66}"/>
+              </a:ext>
+            </a:extLst>
+          </p:cNvPr>
+          <p:cNvSpPr>
+            <a:spLocks noGrp="1"/>
+          </p:cNvSpPr>
+          <p:nvPr>
+            <p:ph type="dt" sz="half" idx="10"/>
+          </p:nvPr>
+        </p:nvSpPr>
+        <p:spPr/>
+        <p:txBody>
+          <a:bodyPr/>
+          <a:lstStyle/>
+          <a:p>
+            <a:r>
+              <a:rPr lang="fr-FR"/>
+              <a:t>Session d'hiver 2023</a:t>
+            </a:r>
+            <a:endParaRPr lang="en-US"/>
+          </a:p>
+        </p:txBody>
+      </p:sp>
+      <p:sp>
+        <p:nvSpPr>
+          <p:cNvPr id="12" name="Espace réservé du pied de page 11">
+            <a:extLst>
+              <a:ext uri="{FF2B5EF4-FFF2-40B4-BE49-F238E27FC236}">
+                <a16:creationId xmlns:a16="http://schemas.microsoft.com/office/drawing/2014/main" id="{473C4718-764E-EB86-5153-E888F969D93D}"/>
+              </a:ext>
+            </a:extLst>
+          </p:cNvPr>
+          <p:cNvSpPr>
+            <a:spLocks noGrp="1"/>
+          </p:cNvSpPr>
+          <p:nvPr>
+            <p:ph type="ftr" sz="quarter" idx="11"/>
+          </p:nvPr>
+        </p:nvSpPr>
+        <p:spPr/>
+        <p:txBody>
+          <a:bodyPr/>
+          <a:lstStyle/>
+          <a:p>
+            <a:r>
+              <a:rPr lang="en-US"/>
+              <a:t>Université Laval - Cours STT-7335</a:t>
+            </a:r>
+          </a:p>
+        </p:txBody>
+      </p:sp>
+      <p:sp>
+        <p:nvSpPr>
+          <p:cNvPr id="13" name="Espace réservé du numéro de diapositive 12">
+            <a:extLst>
+              <a:ext uri="{FF2B5EF4-FFF2-40B4-BE49-F238E27FC236}">
+                <a16:creationId xmlns:a16="http://schemas.microsoft.com/office/drawing/2014/main" id="{96D5BAF7-1139-757D-D3CD-4A07201D84C1}"/>
+              </a:ext>
+            </a:extLst>
+          </p:cNvPr>
+          <p:cNvSpPr>
+            <a:spLocks noGrp="1"/>
+          </p:cNvSpPr>
+          <p:nvPr>
+            <p:ph type="sldNum" sz="quarter" idx="12"/>
+          </p:nvPr>
+        </p:nvSpPr>
+        <p:spPr/>
+        <p:txBody>
+          <a:bodyPr/>
+          <a:lstStyle/>
+          <a:p>
+            <a:fld id="{73B850FF-6169-4056-8077-06FFA93A5366}" type="slidenum">
+              <a:rPr lang="en-US" smtClean="0"/>
+              <a:t>2</a:t>
+            </a:fld>
+            <a:endParaRPr lang="en-US"/>
+          </a:p>
+        </p:txBody>
+      </p:sp>
+    </p:spTree>
+    <p:extLst>
+      <p:ext uri="{BB962C8B-B14F-4D97-AF65-F5344CB8AC3E}">
+        <p14:creationId xmlns:p14="http://schemas.microsoft.com/office/powerpoint/2010/main" val="3599994164"/>
+      </p:ext>
+    </p:extLst>
+  </p:cSld>
+  <p:clrMapOvr>
+    <a:masterClrMapping/>
+  </p:clrMapOvr>
+</p:sld>
+</file>
+
+<file path=ppt/slides/slide20.xml><?xml version="1.0" encoding="utf-8"?>
 <p:sld xmlns:a="http://schemas.openxmlformats.org/drawingml/2006/main" xmlns:r="http://schemas.openxmlformats.org/officeDocument/2006/relationships" xmlns:p="http://schemas.openxmlformats.org/presentationml/2006/main">
   <p:cSld>
     <p:spTree>
@@ -30920,185 +30943,241 @@
               <a:t>Modèles MRF: </a:t>
             </a:r>
             <a:r>
-              <a:rPr lang="fr-CA" dirty="0" err="1">
+              <a:rPr lang="fr-CA" b="0" i="0" dirty="0" err="1">
                 <a:solidFill>
-                  <a:schemeClr val="tx1"/>
+                  <a:srgbClr val="222222"/>
                 </a:solidFill>
+                <a:effectLst/>
                 <a:latin typeface="Arial" panose="020B0604020202020204" pitchFamily="34" charset="0"/>
               </a:rPr>
               <a:t>Tarabalka</a:t>
             </a:r>
             <a:r>
-              <a:rPr lang="fr-CA" dirty="0">
+              <a:rPr lang="fr-CA" b="0" i="0" dirty="0">
                 <a:solidFill>
-                  <a:schemeClr val="tx1"/>
+                  <a:srgbClr val="222222"/>
                 </a:solidFill>
+                <a:effectLst/>
                 <a:latin typeface="Arial" panose="020B0604020202020204" pitchFamily="34" charset="0"/>
               </a:rPr>
               <a:t>, Y., Fauvel, M., </a:t>
             </a:r>
             <a:r>
-              <a:rPr lang="fr-CA" dirty="0" err="1">
+              <a:rPr lang="fr-CA" b="0" i="0" dirty="0" err="1">
                 <a:solidFill>
-                  <a:schemeClr val="tx1"/>
+                  <a:srgbClr val="222222"/>
                 </a:solidFill>
+                <a:effectLst/>
                 <a:latin typeface="Arial" panose="020B0604020202020204" pitchFamily="34" charset="0"/>
               </a:rPr>
               <a:t>Chanussot</a:t>
             </a:r>
             <a:r>
-              <a:rPr lang="fr-CA" dirty="0">
+              <a:rPr lang="fr-CA" b="0" i="0" dirty="0">
                 <a:solidFill>
-                  <a:schemeClr val="tx1"/>
+                  <a:srgbClr val="222222"/>
                 </a:solidFill>
+                <a:effectLst/>
                 <a:latin typeface="Arial" panose="020B0604020202020204" pitchFamily="34" charset="0"/>
               </a:rPr>
               <a:t>, J., &amp; </a:t>
             </a:r>
             <a:r>
-              <a:rPr lang="fr-CA" dirty="0" err="1">
+              <a:rPr lang="fr-CA" b="0" i="0" dirty="0" err="1">
                 <a:solidFill>
-                  <a:schemeClr val="tx1"/>
+                  <a:srgbClr val="222222"/>
                 </a:solidFill>
+                <a:effectLst/>
                 <a:latin typeface="Arial" panose="020B0604020202020204" pitchFamily="34" charset="0"/>
               </a:rPr>
               <a:t>Benediktsson</a:t>
             </a:r>
             <a:r>
-              <a:rPr lang="fr-CA" dirty="0">
+              <a:rPr lang="fr-CA" b="0" i="0" dirty="0">
                 <a:solidFill>
-                  <a:schemeClr val="tx1"/>
+                  <a:srgbClr val="222222"/>
                 </a:solidFill>
+                <a:effectLst/>
                 <a:latin typeface="Arial" panose="020B0604020202020204" pitchFamily="34" charset="0"/>
               </a:rPr>
               <a:t>, J. A. (2010). SVM-and MRF-</a:t>
             </a:r>
             <a:r>
-              <a:rPr lang="fr-CA" dirty="0" err="1">
+              <a:rPr lang="fr-CA" b="0" i="0" dirty="0" err="1">
                 <a:solidFill>
-                  <a:schemeClr val="tx1"/>
+                  <a:srgbClr val="222222"/>
                 </a:solidFill>
+                <a:effectLst/>
                 <a:latin typeface="Arial" panose="020B0604020202020204" pitchFamily="34" charset="0"/>
               </a:rPr>
               <a:t>based</a:t>
             </a:r>
             <a:r>
-              <a:rPr lang="fr-CA" dirty="0">
+              <a:rPr lang="fr-CA" b="0" i="0" dirty="0">
                 <a:solidFill>
-                  <a:schemeClr val="tx1"/>
+                  <a:srgbClr val="222222"/>
                 </a:solidFill>
+                <a:effectLst/>
                 <a:latin typeface="Arial" panose="020B0604020202020204" pitchFamily="34" charset="0"/>
               </a:rPr>
               <a:t> </a:t>
             </a:r>
             <a:r>
-              <a:rPr lang="fr-CA" dirty="0" err="1">
+              <a:rPr lang="fr-CA" b="0" i="0" dirty="0" err="1">
                 <a:solidFill>
-                  <a:schemeClr val="tx1"/>
+                  <a:srgbClr val="222222"/>
                 </a:solidFill>
+                <a:effectLst/>
                 <a:latin typeface="Arial" panose="020B0604020202020204" pitchFamily="34" charset="0"/>
               </a:rPr>
               <a:t>method</a:t>
             </a:r>
             <a:r>
-              <a:rPr lang="fr-CA" dirty="0">
+              <a:rPr lang="fr-CA" b="0" i="0" dirty="0">
                 <a:solidFill>
-                  <a:schemeClr val="tx1"/>
+                  <a:srgbClr val="222222"/>
                 </a:solidFill>
+                <a:effectLst/>
                 <a:latin typeface="Arial" panose="020B0604020202020204" pitchFamily="34" charset="0"/>
               </a:rPr>
               <a:t> for </a:t>
             </a:r>
             <a:r>
-              <a:rPr lang="fr-CA" dirty="0" err="1">
+              <a:rPr lang="fr-CA" b="0" i="0" dirty="0" err="1">
                 <a:solidFill>
-                  <a:schemeClr val="tx1"/>
+                  <a:srgbClr val="222222"/>
                 </a:solidFill>
+                <a:effectLst/>
                 <a:latin typeface="Arial" panose="020B0604020202020204" pitchFamily="34" charset="0"/>
               </a:rPr>
               <a:t>accurate</a:t>
             </a:r>
             <a:r>
-              <a:rPr lang="fr-CA" dirty="0">
+              <a:rPr lang="fr-CA" b="0" i="0" dirty="0">
                 <a:solidFill>
-                  <a:schemeClr val="tx1"/>
+                  <a:srgbClr val="222222"/>
                 </a:solidFill>
+                <a:effectLst/>
                 <a:latin typeface="Arial" panose="020B0604020202020204" pitchFamily="34" charset="0"/>
               </a:rPr>
-              <a:t> classification of hyperspectral images. IEEE </a:t>
+              <a:t> classification of hyperspectral images. </a:t>
             </a:r>
             <a:r>
-              <a:rPr lang="fr-CA" dirty="0" err="1">
+              <a:rPr lang="fr-CA" b="0" i="1" dirty="0">
                 <a:solidFill>
-                  <a:schemeClr val="tx1"/>
+                  <a:srgbClr val="222222"/>
                 </a:solidFill>
+                <a:effectLst/>
+                <a:latin typeface="Arial" panose="020B0604020202020204" pitchFamily="34" charset="0"/>
+              </a:rPr>
+              <a:t>IEEE </a:t>
+            </a:r>
+            <a:r>
+              <a:rPr lang="fr-CA" b="0" i="1" dirty="0" err="1">
+                <a:solidFill>
+                  <a:srgbClr val="222222"/>
+                </a:solidFill>
+                <a:effectLst/>
                 <a:latin typeface="Arial" panose="020B0604020202020204" pitchFamily="34" charset="0"/>
               </a:rPr>
               <a:t>Geoscience</a:t>
             </a:r>
             <a:r>
-              <a:rPr lang="fr-CA" dirty="0">
+              <a:rPr lang="fr-CA" b="0" i="1" dirty="0">
                 <a:solidFill>
-                  <a:schemeClr val="tx1"/>
+                  <a:srgbClr val="222222"/>
                 </a:solidFill>
+                <a:effectLst/>
                 <a:latin typeface="Arial" panose="020B0604020202020204" pitchFamily="34" charset="0"/>
               </a:rPr>
               <a:t> and </a:t>
             </a:r>
             <a:r>
-              <a:rPr lang="fr-CA" dirty="0" err="1">
+              <a:rPr lang="fr-CA" b="0" i="1" dirty="0" err="1">
                 <a:solidFill>
-                  <a:schemeClr val="tx1"/>
+                  <a:srgbClr val="222222"/>
                 </a:solidFill>
+                <a:effectLst/>
                 <a:latin typeface="Arial" panose="020B0604020202020204" pitchFamily="34" charset="0"/>
               </a:rPr>
               <a:t>Remote</a:t>
             </a:r>
             <a:r>
-              <a:rPr lang="fr-CA" dirty="0">
+              <a:rPr lang="fr-CA" b="0" i="1" dirty="0">
                 <a:solidFill>
-                  <a:schemeClr val="tx1"/>
+                  <a:srgbClr val="222222"/>
                 </a:solidFill>
+                <a:effectLst/>
                 <a:latin typeface="Arial" panose="020B0604020202020204" pitchFamily="34" charset="0"/>
               </a:rPr>
               <a:t> </a:t>
             </a:r>
             <a:r>
-              <a:rPr lang="fr-CA" dirty="0" err="1">
+              <a:rPr lang="fr-CA" b="0" i="1" dirty="0" err="1">
                 <a:solidFill>
-                  <a:schemeClr val="tx1"/>
+                  <a:srgbClr val="222222"/>
                 </a:solidFill>
+                <a:effectLst/>
                 <a:latin typeface="Arial" panose="020B0604020202020204" pitchFamily="34" charset="0"/>
               </a:rPr>
               <a:t>Sensing</a:t>
             </a:r>
             <a:r>
-              <a:rPr lang="fr-CA" dirty="0">
+              <a:rPr lang="fr-CA" b="0" i="1" dirty="0">
                 <a:solidFill>
-                  <a:schemeClr val="tx1"/>
+                  <a:srgbClr val="222222"/>
                 </a:solidFill>
+                <a:effectLst/>
                 <a:latin typeface="Arial" panose="020B0604020202020204" pitchFamily="34" charset="0"/>
               </a:rPr>
               <a:t> </a:t>
             </a:r>
             <a:r>
-              <a:rPr lang="fr-CA" dirty="0" err="1">
+              <a:rPr lang="fr-CA" b="0" i="1" dirty="0" err="1">
                 <a:solidFill>
-                  <a:schemeClr val="tx1"/>
+                  <a:srgbClr val="222222"/>
                 </a:solidFill>
+                <a:effectLst/>
                 <a:latin typeface="Arial" panose="020B0604020202020204" pitchFamily="34" charset="0"/>
               </a:rPr>
               <a:t>Letters</a:t>
             </a:r>
             <a:r>
-              <a:rPr lang="fr-CA" dirty="0">
+              <a:rPr lang="fr-CA" b="0" i="0" dirty="0">
                 <a:solidFill>
-                  <a:schemeClr val="tx1"/>
+                  <a:srgbClr val="222222"/>
                 </a:solidFill>
+                <a:effectLst/>
                 <a:latin typeface="Arial" panose="020B0604020202020204" pitchFamily="34" charset="0"/>
               </a:rPr>
-              <a:t>, 7(4), 736-740.</a:t>
+              <a:t>, </a:t>
             </a:r>
+            <a:r>
+              <a:rPr lang="fr-CA" b="0" i="1" dirty="0">
+                <a:solidFill>
+                  <a:srgbClr val="222222"/>
+                </a:solidFill>
+                <a:effectLst/>
+                <a:latin typeface="Arial" panose="020B0604020202020204" pitchFamily="34" charset="0"/>
+              </a:rPr>
+              <a:t>7</a:t>
+            </a:r>
+            <a:r>
+              <a:rPr lang="fr-CA" b="0" i="0" dirty="0">
+                <a:solidFill>
+                  <a:srgbClr val="222222"/>
+                </a:solidFill>
+                <a:effectLst/>
+                <a:latin typeface="Arial" panose="020B0604020202020204" pitchFamily="34" charset="0"/>
+              </a:rPr>
+              <a:t>(4), 736-740.</a:t>
+            </a:r>
+            <a:endParaRPr lang="fr-CA" dirty="0">
+              <a:solidFill>
+                <a:schemeClr val="tx1"/>
+              </a:solidFill>
+              <a:latin typeface="Arial" panose="020B0604020202020204" pitchFamily="34" charset="0"/>
+            </a:endParaRPr>
           </a:p>
         </p:txBody>
       </p:sp>
@@ -31182,7 +31261,7 @@
           <a:p>
             <a:fld id="{73B850FF-6169-4056-8077-06FFA93A5366}" type="slidenum">
               <a:rPr lang="en-US" smtClean="0"/>
-              <a:t>21</a:t>
+              <a:t>20</a:t>
             </a:fld>
             <a:endParaRPr lang="en-US"/>
           </a:p>
@@ -31201,7 +31280,7 @@
 </p:sld>
 </file>
 
-<file path=ppt/slides/slide22.xml><?xml version="1.0" encoding="utf-8"?>
+<file path=ppt/slides/slide21.xml><?xml version="1.0" encoding="utf-8"?>
 <p:sld xmlns:a="http://schemas.openxmlformats.org/drawingml/2006/main" xmlns:r="http://schemas.openxmlformats.org/officeDocument/2006/relationships" xmlns:p="http://schemas.openxmlformats.org/presentationml/2006/main">
   <p:cSld>
     <p:spTree>
@@ -31675,7 +31754,7 @@
           <a:p>
             <a:fld id="{73B850FF-6169-4056-8077-06FFA93A5366}" type="slidenum">
               <a:rPr lang="en-US" smtClean="0"/>
-              <a:t>22</a:t>
+              <a:t>21</a:t>
             </a:fld>
             <a:endParaRPr lang="en-US"/>
           </a:p>
@@ -43714,7 +43793,12 @@
             <p:ph type="title"/>
           </p:nvPr>
         </p:nvSpPr>
-        <p:spPr/>
+        <p:spPr>
+          <a:xfrm>
+            <a:off x="838200" y="365125"/>
+            <a:ext cx="8349343" cy="1491317"/>
+          </a:xfrm>
+        </p:spPr>
         <p:txBody>
           <a:bodyPr/>
           <a:lstStyle/>

</xml_diff>